<commit_message>
final commit, presentation edited
</commit_message>
<xml_diff>
--- a/SC PSP final.pptx
+++ b/SC PSP final.pptx
@@ -8554,7 +8554,7 @@
             <p:ph idx="1"/>
             <p:extLst>
               <p:ext uri="{D42A27DB-BD31-4B8C-83A1-F6EECF244321}">
-                <p14:modId xmlns:p14="http://schemas.microsoft.com/office/powerpoint/2010/main" val="943836576"/>
+                <p14:modId xmlns:p14="http://schemas.microsoft.com/office/powerpoint/2010/main" val="773763199"/>
               </p:ext>
             </p:extLst>
           </p:nvPr>
@@ -8719,19 +8719,6 @@
                     <a:p>
                       <a:r>
                         <a:rPr lang="en-US" dirty="0"/>
-                        <a:t>65</a:t>
-                      </a:r>
-                    </a:p>
-                  </a:txBody>
-                  <a:tcPr/>
-                </a:tc>
-                <a:tc>
-                  <a:txBody>
-                    <a:bodyPr/>
-                    <a:lstStyle/>
-                    <a:p>
-                      <a:r>
-                        <a:rPr lang="en-US" dirty="0"/>
                         <a:t>66</a:t>
                       </a:r>
                     </a:p>
@@ -8771,7 +8758,20 @@
                     <a:p>
                       <a:r>
                         <a:rPr lang="en-US" dirty="0"/>
-                        <a:t>67</a:t>
+                        <a:t>70</a:t>
+                      </a:r>
+                    </a:p>
+                  </a:txBody>
+                  <a:tcPr/>
+                </a:tc>
+                <a:tc>
+                  <a:txBody>
+                    <a:bodyPr/>
+                    <a:lstStyle/>
+                    <a:p>
+                      <a:r>
+                        <a:rPr lang="en-US" dirty="0"/>
+                        <a:t>69</a:t>
                       </a:r>
                     </a:p>
                   </a:txBody>

</xml_diff>